<commit_message>
updated WBS and presentation
</commit_message>
<xml_diff>
--- a/Design Review 1.pptx
+++ b/Design Review 1.pptx
@@ -108,6 +108,11 @@
       </a:defRPr>
     </a:lvl9pPr>
   </p:defaultTextStyle>
+  <p:extLst>
+    <p:ext uri="{EFAFB233-063F-42B5-8137-9DF3F51BA10A}">
+      <p15:sldGuideLst xmlns:p15="http://schemas.microsoft.com/office/powerpoint/2012/main"/>
+    </p:ext>
+  </p:extLst>
 </p:presentation>
 </file>
 
@@ -242,7 +247,7 @@
           <a:p>
             <a:fld id="{D0556BD2-5805-4A9A-9AA1-B6243C7140AD}" type="datetimeFigureOut">
               <a:rPr lang="en-US" smtClean="0"/>
-              <a:t>9/4/2017</a:t>
+              <a:t>9/8/2017</a:t>
             </a:fld>
             <a:endParaRPr lang="en-US"/>
           </a:p>
@@ -412,7 +417,7 @@
           <a:p>
             <a:fld id="{D0556BD2-5805-4A9A-9AA1-B6243C7140AD}" type="datetimeFigureOut">
               <a:rPr lang="en-US" smtClean="0"/>
-              <a:t>9/4/2017</a:t>
+              <a:t>9/8/2017</a:t>
             </a:fld>
             <a:endParaRPr lang="en-US"/>
           </a:p>
@@ -592,7 +597,7 @@
           <a:p>
             <a:fld id="{D0556BD2-5805-4A9A-9AA1-B6243C7140AD}" type="datetimeFigureOut">
               <a:rPr lang="en-US" smtClean="0"/>
-              <a:t>9/4/2017</a:t>
+              <a:t>9/8/2017</a:t>
             </a:fld>
             <a:endParaRPr lang="en-US"/>
           </a:p>
@@ -762,7 +767,7 @@
           <a:p>
             <a:fld id="{D0556BD2-5805-4A9A-9AA1-B6243C7140AD}" type="datetimeFigureOut">
               <a:rPr lang="en-US" smtClean="0"/>
-              <a:t>9/4/2017</a:t>
+              <a:t>9/8/2017</a:t>
             </a:fld>
             <a:endParaRPr lang="en-US"/>
           </a:p>
@@ -1008,7 +1013,7 @@
           <a:p>
             <a:fld id="{D0556BD2-5805-4A9A-9AA1-B6243C7140AD}" type="datetimeFigureOut">
               <a:rPr lang="en-US" smtClean="0"/>
-              <a:t>9/4/2017</a:t>
+              <a:t>9/8/2017</a:t>
             </a:fld>
             <a:endParaRPr lang="en-US"/>
           </a:p>
@@ -1240,7 +1245,7 @@
           <a:p>
             <a:fld id="{D0556BD2-5805-4A9A-9AA1-B6243C7140AD}" type="datetimeFigureOut">
               <a:rPr lang="en-US" smtClean="0"/>
-              <a:t>9/4/2017</a:t>
+              <a:t>9/8/2017</a:t>
             </a:fld>
             <a:endParaRPr lang="en-US"/>
           </a:p>
@@ -1607,7 +1612,7 @@
           <a:p>
             <a:fld id="{D0556BD2-5805-4A9A-9AA1-B6243C7140AD}" type="datetimeFigureOut">
               <a:rPr lang="en-US" smtClean="0"/>
-              <a:t>9/4/2017</a:t>
+              <a:t>9/8/2017</a:t>
             </a:fld>
             <a:endParaRPr lang="en-US"/>
           </a:p>
@@ -1725,7 +1730,7 @@
           <a:p>
             <a:fld id="{D0556BD2-5805-4A9A-9AA1-B6243C7140AD}" type="datetimeFigureOut">
               <a:rPr lang="en-US" smtClean="0"/>
-              <a:t>9/4/2017</a:t>
+              <a:t>9/8/2017</a:t>
             </a:fld>
             <a:endParaRPr lang="en-US"/>
           </a:p>
@@ -1820,7 +1825,7 @@
           <a:p>
             <a:fld id="{D0556BD2-5805-4A9A-9AA1-B6243C7140AD}" type="datetimeFigureOut">
               <a:rPr lang="en-US" smtClean="0"/>
-              <a:t>9/4/2017</a:t>
+              <a:t>9/8/2017</a:t>
             </a:fld>
             <a:endParaRPr lang="en-US"/>
           </a:p>
@@ -2097,7 +2102,7 @@
           <a:p>
             <a:fld id="{D0556BD2-5805-4A9A-9AA1-B6243C7140AD}" type="datetimeFigureOut">
               <a:rPr lang="en-US" smtClean="0"/>
-              <a:t>9/4/2017</a:t>
+              <a:t>9/8/2017</a:t>
             </a:fld>
             <a:endParaRPr lang="en-US"/>
           </a:p>
@@ -2350,7 +2355,7 @@
           <a:p>
             <a:fld id="{D0556BD2-5805-4A9A-9AA1-B6243C7140AD}" type="datetimeFigureOut">
               <a:rPr lang="en-US" smtClean="0"/>
-              <a:t>9/4/2017</a:t>
+              <a:t>9/8/2017</a:t>
             </a:fld>
             <a:endParaRPr lang="en-US"/>
           </a:p>
@@ -2563,7 +2568,7 @@
           <a:p>
             <a:fld id="{D0556BD2-5805-4A9A-9AA1-B6243C7140AD}" type="datetimeFigureOut">
               <a:rPr lang="en-US" smtClean="0"/>
-              <a:t>9/4/2017</a:t>
+              <a:t>9/8/2017</a:t>
             </a:fld>
             <a:endParaRPr lang="en-US"/>
           </a:p>
@@ -3064,7 +3069,12 @@
             <p:ph type="title"/>
           </p:nvPr>
         </p:nvSpPr>
-        <p:spPr/>
+        <p:spPr>
+          <a:xfrm>
+            <a:off x="838200" y="-66106"/>
+            <a:ext cx="10515600" cy="1325563"/>
+          </a:xfrm>
+        </p:spPr>
         <p:txBody>
           <a:bodyPr/>
           <a:lstStyle/>
@@ -3087,12 +3097,32 @@
             <p:ph idx="1"/>
           </p:nvPr>
         </p:nvSpPr>
-        <p:spPr/>
+        <p:spPr>
+          <a:xfrm>
+            <a:off x="838200" y="1061050"/>
+            <a:ext cx="10515600" cy="5796950"/>
+          </a:xfrm>
+        </p:spPr>
         <p:txBody>
           <a:bodyPr>
-            <a:normAutofit fontScale="55000" lnSpcReduction="20000"/>
+            <a:normAutofit fontScale="47500" lnSpcReduction="20000"/>
           </a:bodyPr>
           <a:lstStyle/>
+          <a:p>
+            <a:pPr lvl="0"/>
+            <a:r>
+              <a:rPr lang="en-US" dirty="0"/>
+              <a:t>System shall be able to establish link with remote access </a:t>
+            </a:r>
+            <a:r>
+              <a:rPr lang="en-US" dirty="0" smtClean="0"/>
+              <a:t>computer </a:t>
+            </a:r>
+            <a:r>
+              <a:rPr lang="en-US" dirty="0"/>
+              <a:t>using SpaceX NAP.</a:t>
+            </a:r>
+          </a:p>
           <a:p>
             <a:pPr lvl="0"/>
             <a:r>
@@ -3104,7 +3134,49 @@
             <a:pPr lvl="1"/>
             <a:r>
               <a:rPr lang="en-US" dirty="0"/>
-              <a:t>System shall begin startup sequence upon receiving start signal from communications processor.</a:t>
+              <a:t>System shall begin startup sequence upon receiving start signal from communications processor/remote computer.</a:t>
+            </a:r>
+          </a:p>
+          <a:p>
+            <a:pPr lvl="1"/>
+            <a:r>
+              <a:rPr lang="en-US" dirty="0"/>
+              <a:t>System shall be able to initialize and check state of each subsystem including:</a:t>
+            </a:r>
+          </a:p>
+          <a:p>
+            <a:pPr lvl="2"/>
+            <a:r>
+              <a:rPr lang="en-US" dirty="0"/>
+              <a:t>Levitation System</a:t>
+            </a:r>
+          </a:p>
+          <a:p>
+            <a:pPr lvl="2"/>
+            <a:r>
+              <a:rPr lang="en-US" dirty="0"/>
+              <a:t>Magnetic Braking</a:t>
+            </a:r>
+          </a:p>
+          <a:p>
+            <a:pPr lvl="2"/>
+            <a:r>
+              <a:rPr lang="en-US" dirty="0"/>
+              <a:t>Disc Brakes</a:t>
+            </a:r>
+          </a:p>
+          <a:p>
+            <a:pPr lvl="2"/>
+            <a:r>
+              <a:rPr lang="en-US" dirty="0"/>
+              <a:t>Propulsion</a:t>
+            </a:r>
+          </a:p>
+          <a:p>
+            <a:pPr lvl="2"/>
+            <a:r>
+              <a:rPr lang="en-US" dirty="0"/>
+              <a:t>Power</a:t>
             </a:r>
           </a:p>
           <a:p>
@@ -3195,7 +3267,7 @@
             <a:pPr lvl="0"/>
             <a:r>
               <a:rPr lang="en-US" dirty="0"/>
-              <a:t>System shall be able to communicate between microprocessors of other subsystems and monitor their condition.</a:t>
+              <a:t>System shall be able to communicate between microprocessors of other subsystems and monitor their condition in real time.</a:t>
             </a:r>
           </a:p>
           <a:p>
@@ -3213,6 +3285,22 @@
             </a:r>
           </a:p>
           <a:p>
+            <a:pPr lvl="0"/>
+            <a:r>
+              <a:rPr lang="en-US" dirty="0"/>
+              <a:t>System shall implement a STOP call from remote access computer.</a:t>
+            </a:r>
+          </a:p>
+          <a:p>
+            <a:pPr lvl="0"/>
+            <a:r>
+              <a:rPr lang="en-US" dirty="0"/>
+              <a:t>System must allow for movability of pod at low speeds when not in operation to allow for transport and recovery exercises</a:t>
+            </a:r>
+            <a:r>
+              <a:rPr lang="en-US" dirty="0" smtClean="0"/>
+              <a:t>.</a:t>
+            </a:r>
             <a:endParaRPr lang="en-US" dirty="0"/>
           </a:p>
         </p:txBody>
@@ -3344,7 +3432,7 @@
       </p:sp>
       <p:pic>
         <p:nvPicPr>
-          <p:cNvPr id="4" name="Content Placeholder 3"/>
+          <p:cNvPr id="5" name="Content Placeholder 4"/>
           <p:cNvPicPr>
             <a:picLocks noGrp="1" noChangeAspect="1"/>
           </p:cNvPicPr>
@@ -3366,8 +3454,8 @@
         </p:blipFill>
         <p:spPr>
           <a:xfrm>
-            <a:off x="2513729" y="669685"/>
-            <a:ext cx="7906979" cy="5371382"/>
+            <a:off x="2674165" y="173989"/>
+            <a:ext cx="8057096" cy="6417042"/>
           </a:xfrm>
         </p:spPr>
       </p:pic>
@@ -3418,7 +3506,7 @@
           <a:p>
             <a:r>
               <a:rPr lang="en-US" dirty="0" smtClean="0"/>
-              <a:t>Budget</a:t>
+              <a:t>Questions</a:t>
             </a:r>
             <a:endParaRPr lang="en-US" dirty="0"/>
           </a:p>
@@ -3439,7 +3527,13 @@
           <a:bodyPr/>
           <a:lstStyle/>
           <a:p>
-            <a:endParaRPr lang="en-US"/>
+            <a:r>
+              <a:rPr lang="en-US" dirty="0" smtClean="0"/>
+              <a:t>Scope of our work</a:t>
+            </a:r>
+          </a:p>
+          <a:p>
+            <a:endParaRPr lang="en-US" dirty="0"/>
           </a:p>
         </p:txBody>
       </p:sp>

</xml_diff>

<commit_message>
worked design review ppt
</commit_message>
<xml_diff>
--- a/Design Review 1.pptx
+++ b/Design Review 1.pptx
@@ -247,7 +247,7 @@
           <a:p>
             <a:fld id="{D0556BD2-5805-4A9A-9AA1-B6243C7140AD}" type="datetimeFigureOut">
               <a:rPr lang="en-US" smtClean="0"/>
-              <a:t>9/8/2017</a:t>
+              <a:t>9/10/2017</a:t>
             </a:fld>
             <a:endParaRPr lang="en-US"/>
           </a:p>
@@ -417,7 +417,7 @@
           <a:p>
             <a:fld id="{D0556BD2-5805-4A9A-9AA1-B6243C7140AD}" type="datetimeFigureOut">
               <a:rPr lang="en-US" smtClean="0"/>
-              <a:t>9/8/2017</a:t>
+              <a:t>9/10/2017</a:t>
             </a:fld>
             <a:endParaRPr lang="en-US"/>
           </a:p>
@@ -597,7 +597,7 @@
           <a:p>
             <a:fld id="{D0556BD2-5805-4A9A-9AA1-B6243C7140AD}" type="datetimeFigureOut">
               <a:rPr lang="en-US" smtClean="0"/>
-              <a:t>9/8/2017</a:t>
+              <a:t>9/10/2017</a:t>
             </a:fld>
             <a:endParaRPr lang="en-US"/>
           </a:p>
@@ -767,7 +767,7 @@
           <a:p>
             <a:fld id="{D0556BD2-5805-4A9A-9AA1-B6243C7140AD}" type="datetimeFigureOut">
               <a:rPr lang="en-US" smtClean="0"/>
-              <a:t>9/8/2017</a:t>
+              <a:t>9/10/2017</a:t>
             </a:fld>
             <a:endParaRPr lang="en-US"/>
           </a:p>
@@ -1013,7 +1013,7 @@
           <a:p>
             <a:fld id="{D0556BD2-5805-4A9A-9AA1-B6243C7140AD}" type="datetimeFigureOut">
               <a:rPr lang="en-US" smtClean="0"/>
-              <a:t>9/8/2017</a:t>
+              <a:t>9/10/2017</a:t>
             </a:fld>
             <a:endParaRPr lang="en-US"/>
           </a:p>
@@ -1245,7 +1245,7 @@
           <a:p>
             <a:fld id="{D0556BD2-5805-4A9A-9AA1-B6243C7140AD}" type="datetimeFigureOut">
               <a:rPr lang="en-US" smtClean="0"/>
-              <a:t>9/8/2017</a:t>
+              <a:t>9/10/2017</a:t>
             </a:fld>
             <a:endParaRPr lang="en-US"/>
           </a:p>
@@ -1612,7 +1612,7 @@
           <a:p>
             <a:fld id="{D0556BD2-5805-4A9A-9AA1-B6243C7140AD}" type="datetimeFigureOut">
               <a:rPr lang="en-US" smtClean="0"/>
-              <a:t>9/8/2017</a:t>
+              <a:t>9/10/2017</a:t>
             </a:fld>
             <a:endParaRPr lang="en-US"/>
           </a:p>
@@ -1730,7 +1730,7 @@
           <a:p>
             <a:fld id="{D0556BD2-5805-4A9A-9AA1-B6243C7140AD}" type="datetimeFigureOut">
               <a:rPr lang="en-US" smtClean="0"/>
-              <a:t>9/8/2017</a:t>
+              <a:t>9/10/2017</a:t>
             </a:fld>
             <a:endParaRPr lang="en-US"/>
           </a:p>
@@ -1825,7 +1825,7 @@
           <a:p>
             <a:fld id="{D0556BD2-5805-4A9A-9AA1-B6243C7140AD}" type="datetimeFigureOut">
               <a:rPr lang="en-US" smtClean="0"/>
-              <a:t>9/8/2017</a:t>
+              <a:t>9/10/2017</a:t>
             </a:fld>
             <a:endParaRPr lang="en-US"/>
           </a:p>
@@ -2102,7 +2102,7 @@
           <a:p>
             <a:fld id="{D0556BD2-5805-4A9A-9AA1-B6243C7140AD}" type="datetimeFigureOut">
               <a:rPr lang="en-US" smtClean="0"/>
-              <a:t>9/8/2017</a:t>
+              <a:t>9/10/2017</a:t>
             </a:fld>
             <a:endParaRPr lang="en-US"/>
           </a:p>
@@ -2355,7 +2355,7 @@
           <a:p>
             <a:fld id="{D0556BD2-5805-4A9A-9AA1-B6243C7140AD}" type="datetimeFigureOut">
               <a:rPr lang="en-US" smtClean="0"/>
-              <a:t>9/8/2017</a:t>
+              <a:t>9/10/2017</a:t>
             </a:fld>
             <a:endParaRPr lang="en-US"/>
           </a:p>
@@ -2568,7 +2568,7 @@
           <a:p>
             <a:fld id="{D0556BD2-5805-4A9A-9AA1-B6243C7140AD}" type="datetimeFigureOut">
               <a:rPr lang="en-US" smtClean="0"/>
-              <a:t>9/8/2017</a:t>
+              <a:t>9/10/2017</a:t>
             </a:fld>
             <a:endParaRPr lang="en-US"/>
           </a:p>
@@ -3039,6 +3039,13 @@
   <p:clrMapOvr>
     <a:masterClrMapping/>
   </p:clrMapOvr>
+  <p:timing>
+    <p:tnLst>
+      <p:par>
+        <p:cTn id="1" dur="indefinite" restart="never" nodeType="tmRoot"/>
+      </p:par>
+    </p:tnLst>
+  </p:timing>
 </p:sld>
 </file>
 
@@ -3315,6 +3322,13 @@
   <p:clrMapOvr>
     <a:masterClrMapping/>
   </p:clrMapOvr>
+  <p:timing>
+    <p:tnLst>
+      <p:par>
+        <p:cTn id="1" dur="indefinite" restart="never" nodeType="tmRoot"/>
+      </p:par>
+    </p:tnLst>
+  </p:timing>
 </p:sld>
 </file>
 
@@ -3358,25 +3372,65 @@
           </a:p>
         </p:txBody>
       </p:sp>
-      <p:sp>
-        <p:nvSpPr>
-          <p:cNvPr id="3" name="Content Placeholder 2"/>
-          <p:cNvSpPr>
-            <a:spLocks noGrp="1"/>
-          </p:cNvSpPr>
+      <p:pic>
+        <p:nvPicPr>
+          <p:cNvPr id="4" name="Content Placeholder 3"/>
+          <p:cNvPicPr>
+            <a:picLocks noGrp="1" noChangeAspect="1"/>
+          </p:cNvPicPr>
           <p:nvPr>
             <p:ph idx="1"/>
           </p:nvPr>
-        </p:nvSpPr>
-        <p:spPr/>
-        <p:txBody>
-          <a:bodyPr/>
-          <a:lstStyle/>
-          <a:p>
-            <a:endParaRPr lang="en-US"/>
-          </a:p>
-        </p:txBody>
-      </p:sp>
+        </p:nvPicPr>
+        <p:blipFill>
+          <a:blip r:embed="rId2">
+            <a:extLst>
+              <a:ext uri="{28A0092B-C50C-407E-A947-70E740481C1C}">
+                <a14:useLocalDpi xmlns:a14="http://schemas.microsoft.com/office/drawing/2010/main" val="0"/>
+              </a:ext>
+            </a:extLst>
+          </a:blip>
+          <a:stretch>
+            <a:fillRect/>
+          </a:stretch>
+        </p:blipFill>
+        <p:spPr>
+          <a:xfrm>
+            <a:off x="182818" y="1903273"/>
+            <a:ext cx="7662867" cy="4109338"/>
+          </a:xfrm>
+        </p:spPr>
+      </p:pic>
+      <p:pic>
+        <p:nvPicPr>
+          <p:cNvPr id="5" name="Picture 4"/>
+          <p:cNvPicPr>
+            <a:picLocks noChangeAspect="1"/>
+          </p:cNvPicPr>
+          <p:nvPr/>
+        </p:nvPicPr>
+        <p:blipFill>
+          <a:blip r:embed="rId3">
+            <a:extLst>
+              <a:ext uri="{28A0092B-C50C-407E-A947-70E740481C1C}">
+                <a14:useLocalDpi xmlns:a14="http://schemas.microsoft.com/office/drawing/2010/main" val="0"/>
+              </a:ext>
+            </a:extLst>
+          </a:blip>
+          <a:stretch>
+            <a:fillRect/>
+          </a:stretch>
+        </p:blipFill>
+        <p:spPr>
+          <a:xfrm>
+            <a:off x="7963422" y="0"/>
+            <a:ext cx="4467185" cy="6374921"/>
+          </a:xfrm>
+          <a:prstGeom prst="rect">
+            <a:avLst/>
+          </a:prstGeom>
+        </p:spPr>
+      </p:pic>
     </p:spTree>
     <p:extLst>
       <p:ext uri="{BB962C8B-B14F-4D97-AF65-F5344CB8AC3E}">
@@ -3387,6 +3441,13 @@
   <p:clrMapOvr>
     <a:masterClrMapping/>
   </p:clrMapOvr>
+  <p:timing>
+    <p:tnLst>
+      <p:par>
+        <p:cTn id="1" dur="indefinite" restart="never" nodeType="tmRoot"/>
+      </p:par>
+    </p:tnLst>
+  </p:timing>
 </p:sld>
 </file>
 
@@ -3469,6 +3530,13 @@
   <p:clrMapOvr>
     <a:masterClrMapping/>
   </p:clrMapOvr>
+  <p:timing>
+    <p:tnLst>
+      <p:par>
+        <p:cTn id="1" dur="indefinite" restart="never" nodeType="tmRoot"/>
+      </p:par>
+    </p:tnLst>
+  </p:timing>
 </p:sld>
 </file>
 

</xml_diff>

<commit_message>
Added a revised hardware conceptual design, edited the powerpoints and requirements to include info about heat dissipation and budget
</commit_message>
<xml_diff>
--- a/Design Review 1.pptx
+++ b/Design Review 1.pptx
@@ -8,8 +8,10 @@
     <p:sldId id="256" r:id="rId2"/>
     <p:sldId id="257" r:id="rId3"/>
     <p:sldId id="259" r:id="rId4"/>
-    <p:sldId id="258" r:id="rId5"/>
-    <p:sldId id="260" r:id="rId6"/>
+    <p:sldId id="261" r:id="rId5"/>
+    <p:sldId id="258" r:id="rId6"/>
+    <p:sldId id="262" r:id="rId7"/>
+    <p:sldId id="260" r:id="rId8"/>
   </p:sldIdLst>
   <p:sldSz cx="12192000" cy="6858000"/>
   <p:notesSz cx="6858000" cy="9144000"/>
@@ -247,7 +249,7 @@
           <a:p>
             <a:fld id="{D0556BD2-5805-4A9A-9AA1-B6243C7140AD}" type="datetimeFigureOut">
               <a:rPr lang="en-US" smtClean="0"/>
-              <a:t>9/10/2017</a:t>
+              <a:t>9/11/2017</a:t>
             </a:fld>
             <a:endParaRPr lang="en-US"/>
           </a:p>
@@ -417,7 +419,7 @@
           <a:p>
             <a:fld id="{D0556BD2-5805-4A9A-9AA1-B6243C7140AD}" type="datetimeFigureOut">
               <a:rPr lang="en-US" smtClean="0"/>
-              <a:t>9/10/2017</a:t>
+              <a:t>9/11/2017</a:t>
             </a:fld>
             <a:endParaRPr lang="en-US"/>
           </a:p>
@@ -597,7 +599,7 @@
           <a:p>
             <a:fld id="{D0556BD2-5805-4A9A-9AA1-B6243C7140AD}" type="datetimeFigureOut">
               <a:rPr lang="en-US" smtClean="0"/>
-              <a:t>9/10/2017</a:t>
+              <a:t>9/11/2017</a:t>
             </a:fld>
             <a:endParaRPr lang="en-US"/>
           </a:p>
@@ -767,7 +769,7 @@
           <a:p>
             <a:fld id="{D0556BD2-5805-4A9A-9AA1-B6243C7140AD}" type="datetimeFigureOut">
               <a:rPr lang="en-US" smtClean="0"/>
-              <a:t>9/10/2017</a:t>
+              <a:t>9/11/2017</a:t>
             </a:fld>
             <a:endParaRPr lang="en-US"/>
           </a:p>
@@ -1013,7 +1015,7 @@
           <a:p>
             <a:fld id="{D0556BD2-5805-4A9A-9AA1-B6243C7140AD}" type="datetimeFigureOut">
               <a:rPr lang="en-US" smtClean="0"/>
-              <a:t>9/10/2017</a:t>
+              <a:t>9/11/2017</a:t>
             </a:fld>
             <a:endParaRPr lang="en-US"/>
           </a:p>
@@ -1245,7 +1247,7 @@
           <a:p>
             <a:fld id="{D0556BD2-5805-4A9A-9AA1-B6243C7140AD}" type="datetimeFigureOut">
               <a:rPr lang="en-US" smtClean="0"/>
-              <a:t>9/10/2017</a:t>
+              <a:t>9/11/2017</a:t>
             </a:fld>
             <a:endParaRPr lang="en-US"/>
           </a:p>
@@ -1612,7 +1614,7 @@
           <a:p>
             <a:fld id="{D0556BD2-5805-4A9A-9AA1-B6243C7140AD}" type="datetimeFigureOut">
               <a:rPr lang="en-US" smtClean="0"/>
-              <a:t>9/10/2017</a:t>
+              <a:t>9/11/2017</a:t>
             </a:fld>
             <a:endParaRPr lang="en-US"/>
           </a:p>
@@ -1730,7 +1732,7 @@
           <a:p>
             <a:fld id="{D0556BD2-5805-4A9A-9AA1-B6243C7140AD}" type="datetimeFigureOut">
               <a:rPr lang="en-US" smtClean="0"/>
-              <a:t>9/10/2017</a:t>
+              <a:t>9/11/2017</a:t>
             </a:fld>
             <a:endParaRPr lang="en-US"/>
           </a:p>
@@ -1825,7 +1827,7 @@
           <a:p>
             <a:fld id="{D0556BD2-5805-4A9A-9AA1-B6243C7140AD}" type="datetimeFigureOut">
               <a:rPr lang="en-US" smtClean="0"/>
-              <a:t>9/10/2017</a:t>
+              <a:t>9/11/2017</a:t>
             </a:fld>
             <a:endParaRPr lang="en-US"/>
           </a:p>
@@ -2102,7 +2104,7 @@
           <a:p>
             <a:fld id="{D0556BD2-5805-4A9A-9AA1-B6243C7140AD}" type="datetimeFigureOut">
               <a:rPr lang="en-US" smtClean="0"/>
-              <a:t>9/10/2017</a:t>
+              <a:t>9/11/2017</a:t>
             </a:fld>
             <a:endParaRPr lang="en-US"/>
           </a:p>
@@ -2355,7 +2357,7 @@
           <a:p>
             <a:fld id="{D0556BD2-5805-4A9A-9AA1-B6243C7140AD}" type="datetimeFigureOut">
               <a:rPr lang="en-US" smtClean="0"/>
-              <a:t>9/10/2017</a:t>
+              <a:t>9/11/2017</a:t>
             </a:fld>
             <a:endParaRPr lang="en-US"/>
           </a:p>
@@ -2568,7 +2570,7 @@
           <a:p>
             <a:fld id="{D0556BD2-5805-4A9A-9AA1-B6243C7140AD}" type="datetimeFigureOut">
               <a:rPr lang="en-US" smtClean="0"/>
-              <a:t>9/10/2017</a:t>
+              <a:t>9/11/2017</a:t>
             </a:fld>
             <a:endParaRPr lang="en-US"/>
           </a:p>
@@ -3106,209 +3108,414 @@
         </p:nvSpPr>
         <p:spPr>
           <a:xfrm>
-            <a:off x="838200" y="1061050"/>
+            <a:off x="838200" y="863341"/>
             <a:ext cx="10515600" cy="5796950"/>
           </a:xfrm>
         </p:spPr>
         <p:txBody>
           <a:bodyPr>
-            <a:normAutofit fontScale="47500" lnSpcReduction="20000"/>
+            <a:noAutofit/>
           </a:bodyPr>
           <a:lstStyle/>
           <a:p>
-            <a:pPr lvl="0"/>
-            <a:r>
-              <a:rPr lang="en-US" dirty="0"/>
+            <a:pPr lvl="0">
+              <a:lnSpc>
+                <a:spcPct val="100000"/>
+              </a:lnSpc>
+              <a:spcBef>
+                <a:spcPts val="300"/>
+              </a:spcBef>
+            </a:pPr>
+            <a:r>
+              <a:rPr lang="en-US" sz="1100" dirty="0"/>
               <a:t>System shall be able to establish link with remote access </a:t>
             </a:r>
             <a:r>
-              <a:rPr lang="en-US" dirty="0" smtClean="0"/>
+              <a:rPr lang="en-US" sz="1100" dirty="0" smtClean="0"/>
               <a:t>computer </a:t>
             </a:r>
             <a:r>
-              <a:rPr lang="en-US" dirty="0"/>
+              <a:rPr lang="en-US" sz="1100" dirty="0"/>
               <a:t>using SpaceX NAP.</a:t>
             </a:r>
           </a:p>
           <a:p>
-            <a:pPr lvl="0"/>
-            <a:r>
-              <a:rPr lang="en-US" dirty="0"/>
+            <a:pPr lvl="0">
+              <a:lnSpc>
+                <a:spcPct val="100000"/>
+              </a:lnSpc>
+              <a:spcBef>
+                <a:spcPts val="300"/>
+              </a:spcBef>
+            </a:pPr>
+            <a:r>
+              <a:rPr lang="en-US" sz="1100" dirty="0"/>
               <a:t>System must successfully turn on and properly initialize all subsystems.</a:t>
             </a:r>
           </a:p>
           <a:p>
-            <a:pPr lvl="1"/>
-            <a:r>
-              <a:rPr lang="en-US" dirty="0"/>
+            <a:pPr lvl="1">
+              <a:lnSpc>
+                <a:spcPct val="100000"/>
+              </a:lnSpc>
+              <a:spcBef>
+                <a:spcPts val="300"/>
+              </a:spcBef>
+            </a:pPr>
+            <a:r>
+              <a:rPr lang="en-US" sz="1100" dirty="0"/>
               <a:t>System shall begin startup sequence upon receiving start signal from communications processor/remote computer.</a:t>
             </a:r>
           </a:p>
           <a:p>
-            <a:pPr lvl="1"/>
-            <a:r>
-              <a:rPr lang="en-US" dirty="0"/>
+            <a:pPr lvl="1">
+              <a:lnSpc>
+                <a:spcPct val="100000"/>
+              </a:lnSpc>
+              <a:spcBef>
+                <a:spcPts val="300"/>
+              </a:spcBef>
+            </a:pPr>
+            <a:r>
+              <a:rPr lang="en-US" sz="1100" dirty="0"/>
               <a:t>System shall be able to initialize and check state of each subsystem including:</a:t>
             </a:r>
           </a:p>
           <a:p>
-            <a:pPr lvl="2"/>
-            <a:r>
-              <a:rPr lang="en-US" dirty="0"/>
+            <a:pPr lvl="2">
+              <a:lnSpc>
+                <a:spcPct val="100000"/>
+              </a:lnSpc>
+              <a:spcBef>
+                <a:spcPts val="300"/>
+              </a:spcBef>
+            </a:pPr>
+            <a:r>
+              <a:rPr lang="en-US" sz="1100" dirty="0"/>
               <a:t>Levitation System</a:t>
             </a:r>
           </a:p>
           <a:p>
-            <a:pPr lvl="2"/>
-            <a:r>
-              <a:rPr lang="en-US" dirty="0"/>
+            <a:pPr lvl="2">
+              <a:lnSpc>
+                <a:spcPct val="100000"/>
+              </a:lnSpc>
+              <a:spcBef>
+                <a:spcPts val="300"/>
+              </a:spcBef>
+            </a:pPr>
+            <a:r>
+              <a:rPr lang="en-US" sz="1100" dirty="0"/>
               <a:t>Magnetic Braking</a:t>
             </a:r>
           </a:p>
           <a:p>
-            <a:pPr lvl="2"/>
-            <a:r>
-              <a:rPr lang="en-US" dirty="0"/>
+            <a:pPr lvl="2">
+              <a:lnSpc>
+                <a:spcPct val="100000"/>
+              </a:lnSpc>
+              <a:spcBef>
+                <a:spcPts val="300"/>
+              </a:spcBef>
+            </a:pPr>
+            <a:r>
+              <a:rPr lang="en-US" sz="1100" dirty="0"/>
               <a:t>Disc Brakes</a:t>
             </a:r>
           </a:p>
           <a:p>
-            <a:pPr lvl="2"/>
-            <a:r>
-              <a:rPr lang="en-US" dirty="0"/>
+            <a:pPr lvl="2">
+              <a:lnSpc>
+                <a:spcPct val="100000"/>
+              </a:lnSpc>
+              <a:spcBef>
+                <a:spcPts val="300"/>
+              </a:spcBef>
+            </a:pPr>
+            <a:r>
+              <a:rPr lang="en-US" sz="1100" dirty="0"/>
               <a:t>Propulsion</a:t>
             </a:r>
           </a:p>
           <a:p>
-            <a:pPr lvl="2"/>
-            <a:r>
-              <a:rPr lang="en-US" dirty="0"/>
+            <a:pPr lvl="2">
+              <a:lnSpc>
+                <a:spcPct val="100000"/>
+              </a:lnSpc>
+              <a:spcBef>
+                <a:spcPts val="300"/>
+              </a:spcBef>
+            </a:pPr>
+            <a:r>
+              <a:rPr lang="en-US" sz="1100" dirty="0"/>
               <a:t>Power</a:t>
             </a:r>
           </a:p>
           <a:p>
-            <a:pPr lvl="0"/>
-            <a:r>
-              <a:rPr lang="en-US" dirty="0"/>
+            <a:pPr lvl="0">
+              <a:lnSpc>
+                <a:spcPct val="100000"/>
+              </a:lnSpc>
+              <a:spcBef>
+                <a:spcPts val="300"/>
+              </a:spcBef>
+            </a:pPr>
+            <a:r>
+              <a:rPr lang="en-US" sz="1100" dirty="0"/>
               <a:t>Mag-Lev Arrays Manipulation</a:t>
             </a:r>
           </a:p>
           <a:p>
-            <a:pPr lvl="1"/>
-            <a:r>
-              <a:rPr lang="en-US" dirty="0"/>
+            <a:pPr lvl="1">
+              <a:lnSpc>
+                <a:spcPct val="100000"/>
+              </a:lnSpc>
+              <a:spcBef>
+                <a:spcPts val="300"/>
+              </a:spcBef>
+            </a:pPr>
+            <a:r>
+              <a:rPr lang="en-US" sz="1100" dirty="0"/>
               <a:t>System shall be able to both raise and lower arrays.</a:t>
             </a:r>
           </a:p>
           <a:p>
-            <a:pPr lvl="1"/>
-            <a:r>
-              <a:rPr lang="en-US" dirty="0"/>
+            <a:pPr lvl="1">
+              <a:lnSpc>
+                <a:spcPct val="100000"/>
+              </a:lnSpc>
+              <a:spcBef>
+                <a:spcPts val="300"/>
+              </a:spcBef>
+            </a:pPr>
+            <a:r>
+              <a:rPr lang="en-US" sz="1100" dirty="0"/>
               <a:t>System shall default arrays to safe position, in case of system failure.</a:t>
             </a:r>
           </a:p>
           <a:p>
-            <a:pPr lvl="0"/>
-            <a:r>
-              <a:rPr lang="en-US" dirty="0"/>
+            <a:pPr lvl="0">
+              <a:lnSpc>
+                <a:spcPct val="100000"/>
+              </a:lnSpc>
+              <a:spcBef>
+                <a:spcPts val="300"/>
+              </a:spcBef>
+            </a:pPr>
+            <a:r>
+              <a:rPr lang="en-US" sz="1100" dirty="0"/>
               <a:t>Disc Brakes Application</a:t>
             </a:r>
           </a:p>
           <a:p>
-            <a:pPr lvl="1"/>
-            <a:r>
-              <a:rPr lang="en-US" dirty="0"/>
+            <a:pPr lvl="1">
+              <a:lnSpc>
+                <a:spcPct val="100000"/>
+              </a:lnSpc>
+              <a:spcBef>
+                <a:spcPts val="300"/>
+              </a:spcBef>
+            </a:pPr>
+            <a:r>
+              <a:rPr lang="en-US" sz="1100" dirty="0"/>
               <a:t>System shall be able to effectively apply disc brakes.</a:t>
             </a:r>
           </a:p>
           <a:p>
-            <a:pPr lvl="1"/>
-            <a:r>
-              <a:rPr lang="en-US" dirty="0"/>
+            <a:pPr lvl="1">
+              <a:lnSpc>
+                <a:spcPct val="100000"/>
+              </a:lnSpc>
+              <a:spcBef>
+                <a:spcPts val="300"/>
+              </a:spcBef>
+            </a:pPr>
+            <a:r>
+              <a:rPr lang="en-US" sz="1100" dirty="0"/>
               <a:t>System shall allow of integration of system developed by controls group for overall operation of disc brakes.</a:t>
             </a:r>
           </a:p>
           <a:p>
-            <a:pPr lvl="1"/>
-            <a:r>
-              <a:rPr lang="en-US" dirty="0"/>
+            <a:pPr lvl="1">
+              <a:lnSpc>
+                <a:spcPct val="100000"/>
+              </a:lnSpc>
+              <a:spcBef>
+                <a:spcPts val="300"/>
+              </a:spcBef>
+            </a:pPr>
+            <a:r>
+              <a:rPr lang="en-US" sz="1100" dirty="0"/>
               <a:t>System shall apply brakes in the event of a system failure. </a:t>
             </a:r>
           </a:p>
           <a:p>
-            <a:pPr lvl="0"/>
-            <a:r>
-              <a:rPr lang="en-US" dirty="0"/>
+            <a:pPr lvl="0">
+              <a:lnSpc>
+                <a:spcPct val="100000"/>
+              </a:lnSpc>
+              <a:spcBef>
+                <a:spcPts val="300"/>
+              </a:spcBef>
+            </a:pPr>
+            <a:r>
+              <a:rPr lang="en-US" sz="1100" dirty="0"/>
               <a:t>System shall be able to accurately receive and interpret sensor data.</a:t>
             </a:r>
           </a:p>
           <a:p>
-            <a:pPr lvl="1"/>
-            <a:r>
-              <a:rPr lang="en-US" dirty="0"/>
+            <a:pPr lvl="1">
+              <a:lnSpc>
+                <a:spcPct val="100000"/>
+              </a:lnSpc>
+              <a:spcBef>
+                <a:spcPts val="300"/>
+              </a:spcBef>
+            </a:pPr>
+            <a:r>
+              <a:rPr lang="en-US" sz="1100" dirty="0"/>
               <a:t>System shall be able to determine state of vehicle.</a:t>
             </a:r>
           </a:p>
           <a:p>
-            <a:pPr lvl="1"/>
-            <a:r>
-              <a:rPr lang="en-US" dirty="0"/>
+            <a:pPr lvl="1">
+              <a:lnSpc>
+                <a:spcPct val="100000"/>
+              </a:lnSpc>
+              <a:spcBef>
+                <a:spcPts val="300"/>
+              </a:spcBef>
+            </a:pPr>
+            <a:r>
+              <a:rPr lang="en-US" sz="1100" dirty="0"/>
               <a:t>System shall be able to determine if state is within safe working limits and shut down accordingly if needed.</a:t>
             </a:r>
           </a:p>
           <a:p>
-            <a:pPr lvl="0"/>
-            <a:r>
-              <a:rPr lang="en-US" dirty="0"/>
+            <a:pPr lvl="0">
+              <a:lnSpc>
+                <a:spcPct val="100000"/>
+              </a:lnSpc>
+              <a:spcBef>
+                <a:spcPts val="300"/>
+              </a:spcBef>
+            </a:pPr>
+            <a:r>
+              <a:rPr lang="en-US" sz="1100" dirty="0"/>
               <a:t>System shall be able to accurately and precisely determine both speed and position of pod.</a:t>
             </a:r>
           </a:p>
           <a:p>
-            <a:pPr lvl="0"/>
-            <a:r>
-              <a:rPr lang="en-US" dirty="0"/>
-              <a:t>System shall remain stable at all times after turn on.</a:t>
-            </a:r>
-          </a:p>
-          <a:p>
-            <a:pPr lvl="0"/>
-            <a:r>
-              <a:rPr lang="en-US" dirty="0"/>
+            <a:pPr lvl="0">
+              <a:lnSpc>
+                <a:spcPct val="100000"/>
+              </a:lnSpc>
+              <a:spcBef>
+                <a:spcPts val="300"/>
+              </a:spcBef>
+            </a:pPr>
+            <a:r>
+              <a:rPr lang="en-US" sz="1100" dirty="0"/>
+              <a:t>System shall remain stable at all times after turn on</a:t>
+            </a:r>
+            <a:r>
+              <a:rPr lang="en-US" sz="1100" dirty="0" smtClean="0"/>
+              <a:t>.</a:t>
+            </a:r>
+          </a:p>
+          <a:p>
+            <a:pPr lvl="1">
+              <a:lnSpc>
+                <a:spcPct val="100000"/>
+              </a:lnSpc>
+              <a:spcBef>
+                <a:spcPts val="300"/>
+              </a:spcBef>
+            </a:pPr>
+            <a:r>
+              <a:rPr lang="en-US" sz="1100" dirty="0"/>
+              <a:t>System shall maintain board temperature below 120° </a:t>
+            </a:r>
+            <a:r>
+              <a:rPr lang="en-US" sz="1100" dirty="0" smtClean="0"/>
+              <a:t>C</a:t>
+            </a:r>
+            <a:endParaRPr lang="en-US" sz="1100" dirty="0"/>
+          </a:p>
+          <a:p>
+            <a:pPr lvl="0">
+              <a:lnSpc>
+                <a:spcPct val="100000"/>
+              </a:lnSpc>
+              <a:spcBef>
+                <a:spcPts val="300"/>
+              </a:spcBef>
+            </a:pPr>
+            <a:r>
+              <a:rPr lang="en-US" sz="1100" dirty="0"/>
               <a:t>System shall be able to communicate between microprocessors of other subsystems and monitor their condition in real time.</a:t>
             </a:r>
           </a:p>
           <a:p>
-            <a:pPr lvl="0"/>
-            <a:r>
-              <a:rPr lang="en-US" dirty="0"/>
+            <a:pPr lvl="0">
+              <a:lnSpc>
+                <a:spcPct val="100000"/>
+              </a:lnSpc>
+              <a:spcBef>
+                <a:spcPts val="300"/>
+              </a:spcBef>
+            </a:pPr>
+            <a:r>
+              <a:rPr lang="en-US" sz="1100" dirty="0"/>
               <a:t>System shall minimize its own power consumption.</a:t>
             </a:r>
           </a:p>
           <a:p>
-            <a:pPr lvl="0"/>
-            <a:r>
-              <a:rPr lang="en-US" dirty="0"/>
+            <a:pPr lvl="0">
+              <a:lnSpc>
+                <a:spcPct val="100000"/>
+              </a:lnSpc>
+              <a:spcBef>
+                <a:spcPts val="300"/>
+              </a:spcBef>
+            </a:pPr>
+            <a:r>
+              <a:rPr lang="en-US" sz="1100" dirty="0"/>
               <a:t>System shall include fail safes in case of system failure.</a:t>
             </a:r>
           </a:p>
           <a:p>
-            <a:pPr lvl="0"/>
-            <a:r>
-              <a:rPr lang="en-US" dirty="0"/>
+            <a:pPr lvl="0">
+              <a:lnSpc>
+                <a:spcPct val="100000"/>
+              </a:lnSpc>
+              <a:spcBef>
+                <a:spcPts val="300"/>
+              </a:spcBef>
+            </a:pPr>
+            <a:r>
+              <a:rPr lang="en-US" sz="1100" dirty="0"/>
               <a:t>System shall implement a STOP call from remote access computer.</a:t>
             </a:r>
           </a:p>
           <a:p>
-            <a:pPr lvl="0"/>
-            <a:r>
-              <a:rPr lang="en-US" dirty="0"/>
+            <a:pPr lvl="0">
+              <a:lnSpc>
+                <a:spcPct val="100000"/>
+              </a:lnSpc>
+              <a:spcBef>
+                <a:spcPts val="300"/>
+              </a:spcBef>
+            </a:pPr>
+            <a:r>
+              <a:rPr lang="en-US" sz="1100" dirty="0"/>
               <a:t>System must allow for movability of pod at low speeds when not in operation to allow for transport and recovery exercises</a:t>
             </a:r>
             <a:r>
-              <a:rPr lang="en-US" dirty="0" smtClean="0"/>
+              <a:rPr lang="en-US" sz="1100" dirty="0" smtClean="0"/>
               <a:t>.</a:t>
             </a:r>
-            <a:endParaRPr lang="en-US" dirty="0"/>
+            <a:endParaRPr lang="en-US" sz="1100" dirty="0"/>
           </a:p>
         </p:txBody>
       </p:sp>
@@ -3423,8 +3630,8 @@
         </p:blipFill>
         <p:spPr>
           <a:xfrm>
-            <a:off x="7963422" y="0"/>
-            <a:ext cx="4467185" cy="6374921"/>
+            <a:off x="7845686" y="0"/>
+            <a:ext cx="4584922" cy="6542938"/>
           </a:xfrm>
           <a:prstGeom prst="rect">
             <a:avLst/>
@@ -3483,6 +3690,91 @@
           <a:bodyPr/>
           <a:lstStyle/>
           <a:p>
+            <a:endParaRPr lang="en-US"/>
+          </a:p>
+        </p:txBody>
+      </p:sp>
+      <p:pic>
+        <p:nvPicPr>
+          <p:cNvPr id="8" name="Content Placeholder 7"/>
+          <p:cNvPicPr>
+            <a:picLocks noGrp="1" noChangeAspect="1"/>
+          </p:cNvPicPr>
+          <p:nvPr>
+            <p:ph idx="1"/>
+          </p:nvPr>
+        </p:nvPicPr>
+        <p:blipFill>
+          <a:blip r:embed="rId2">
+            <a:extLst>
+              <a:ext uri="{28A0092B-C50C-407E-A947-70E740481C1C}">
+                <a14:useLocalDpi xmlns:a14="http://schemas.microsoft.com/office/drawing/2010/main" val="0"/>
+              </a:ext>
+            </a:extLst>
+          </a:blip>
+          <a:stretch>
+            <a:fillRect/>
+          </a:stretch>
+        </p:blipFill>
+        <p:spPr>
+          <a:xfrm>
+            <a:off x="262393" y="0"/>
+            <a:ext cx="12192000" cy="6726621"/>
+          </a:xfrm>
+        </p:spPr>
+      </p:pic>
+    </p:spTree>
+    <p:extLst>
+      <p:ext uri="{BB962C8B-B14F-4D97-AF65-F5344CB8AC3E}">
+        <p14:creationId xmlns:p14="http://schemas.microsoft.com/office/powerpoint/2010/main" val="3869591251"/>
+      </p:ext>
+    </p:extLst>
+  </p:cSld>
+  <p:clrMapOvr>
+    <a:masterClrMapping/>
+  </p:clrMapOvr>
+  <p:timing>
+    <p:tnLst>
+      <p:par>
+        <p:cTn id="1" dur="indefinite" restart="never" nodeType="tmRoot"/>
+      </p:par>
+    </p:tnLst>
+  </p:timing>
+</p:sld>
+</file>
+
+<file path=ppt/slides/slide5.xml><?xml version="1.0" encoding="utf-8"?>
+<p:sld xmlns:a="http://schemas.openxmlformats.org/drawingml/2006/main" xmlns:r="http://schemas.openxmlformats.org/officeDocument/2006/relationships" xmlns:p="http://schemas.openxmlformats.org/presentationml/2006/main">
+  <p:cSld>
+    <p:spTree>
+      <p:nvGrpSpPr>
+        <p:cNvPr id="1" name=""/>
+        <p:cNvGrpSpPr/>
+        <p:nvPr/>
+      </p:nvGrpSpPr>
+      <p:grpSpPr>
+        <a:xfrm>
+          <a:off x="0" y="0"/>
+          <a:ext cx="0" cy="0"/>
+          <a:chOff x="0" y="0"/>
+          <a:chExt cx="0" cy="0"/>
+        </a:xfrm>
+      </p:grpSpPr>
+      <p:sp>
+        <p:nvSpPr>
+          <p:cNvPr id="2" name="Title 1"/>
+          <p:cNvSpPr>
+            <a:spLocks noGrp="1"/>
+          </p:cNvSpPr>
+          <p:nvPr>
+            <p:ph type="title"/>
+          </p:nvPr>
+        </p:nvSpPr>
+        <p:spPr/>
+        <p:txBody>
+          <a:bodyPr/>
+          <a:lstStyle/>
+          <a:p>
             <a:r>
               <a:rPr lang="en-US" dirty="0" smtClean="0"/>
               <a:t>WBS</a:t>
@@ -3540,7 +3832,7 @@
 </p:sld>
 </file>
 
-<file path=ppt/slides/slide5.xml><?xml version="1.0" encoding="utf-8"?>
+<file path=ppt/slides/slide6.xml><?xml version="1.0" encoding="utf-8"?>
 <p:sld xmlns:a="http://schemas.openxmlformats.org/drawingml/2006/main" xmlns:r="http://schemas.openxmlformats.org/officeDocument/2006/relationships" xmlns:p="http://schemas.openxmlformats.org/presentationml/2006/main">
   <p:cSld>
     <p:spTree>
@@ -3574,6 +3866,101 @@
           <a:p>
             <a:r>
               <a:rPr lang="en-US" dirty="0" smtClean="0"/>
+              <a:t>Rough Cost</a:t>
+            </a:r>
+            <a:endParaRPr lang="en-US" dirty="0"/>
+          </a:p>
+        </p:txBody>
+      </p:sp>
+      <p:sp>
+        <p:nvSpPr>
+          <p:cNvPr id="3" name="Content Placeholder 2"/>
+          <p:cNvSpPr>
+            <a:spLocks noGrp="1"/>
+          </p:cNvSpPr>
+          <p:nvPr>
+            <p:ph idx="1"/>
+          </p:nvPr>
+        </p:nvSpPr>
+        <p:spPr/>
+        <p:txBody>
+          <a:bodyPr/>
+          <a:lstStyle/>
+          <a:p>
+            <a:r>
+              <a:rPr lang="en-US" dirty="0" smtClean="0"/>
+              <a:t>Two UDOO Quads: 2*$135 = $270</a:t>
+            </a:r>
+          </a:p>
+          <a:p>
+            <a:r>
+              <a:rPr lang="en-US" dirty="0" smtClean="0"/>
+              <a:t>DC/DC Converter: (2)*$33 = $66</a:t>
+            </a:r>
+          </a:p>
+          <a:p>
+            <a:r>
+              <a:rPr lang="en-US" dirty="0" smtClean="0"/>
+              <a:t>Total: $0 to ~$336</a:t>
+            </a:r>
+          </a:p>
+          <a:p>
+            <a:pPr lvl="1"/>
+            <a:r>
+              <a:rPr lang="en-US" dirty="0" smtClean="0"/>
+              <a:t>Depending on what ORU already has</a:t>
+            </a:r>
+            <a:endParaRPr lang="en-US" dirty="0"/>
+          </a:p>
+        </p:txBody>
+      </p:sp>
+    </p:spTree>
+    <p:extLst>
+      <p:ext uri="{BB962C8B-B14F-4D97-AF65-F5344CB8AC3E}">
+        <p14:creationId xmlns:p14="http://schemas.microsoft.com/office/powerpoint/2010/main" val="2230805217"/>
+      </p:ext>
+    </p:extLst>
+  </p:cSld>
+  <p:clrMapOvr>
+    <a:masterClrMapping/>
+  </p:clrMapOvr>
+</p:sld>
+</file>
+
+<file path=ppt/slides/slide7.xml><?xml version="1.0" encoding="utf-8"?>
+<p:sld xmlns:a="http://schemas.openxmlformats.org/drawingml/2006/main" xmlns:r="http://schemas.openxmlformats.org/officeDocument/2006/relationships" xmlns:p="http://schemas.openxmlformats.org/presentationml/2006/main">
+  <p:cSld>
+    <p:spTree>
+      <p:nvGrpSpPr>
+        <p:cNvPr id="1" name=""/>
+        <p:cNvGrpSpPr/>
+        <p:nvPr/>
+      </p:nvGrpSpPr>
+      <p:grpSpPr>
+        <a:xfrm>
+          <a:off x="0" y="0"/>
+          <a:ext cx="0" cy="0"/>
+          <a:chOff x="0" y="0"/>
+          <a:chExt cx="0" cy="0"/>
+        </a:xfrm>
+      </p:grpSpPr>
+      <p:sp>
+        <p:nvSpPr>
+          <p:cNvPr id="2" name="Title 1"/>
+          <p:cNvSpPr>
+            <a:spLocks noGrp="1"/>
+          </p:cNvSpPr>
+          <p:nvPr>
+            <p:ph type="title"/>
+          </p:nvPr>
+        </p:nvSpPr>
+        <p:spPr/>
+        <p:txBody>
+          <a:bodyPr/>
+          <a:lstStyle/>
+          <a:p>
+            <a:r>
+              <a:rPr lang="en-US" dirty="0" smtClean="0"/>
               <a:t>Questions</a:t>
             </a:r>
             <a:endParaRPr lang="en-US" dirty="0"/>
@@ -3599,6 +3986,21 @@
               <a:rPr lang="en-US" dirty="0" smtClean="0"/>
               <a:t>Scope of our work</a:t>
             </a:r>
+          </a:p>
+          <a:p>
+            <a:r>
+              <a:rPr lang="en-US" dirty="0" smtClean="0"/>
+              <a:t>Choice of UDOO boards</a:t>
+            </a:r>
+          </a:p>
+          <a:p>
+            <a:r>
+              <a:rPr lang="en-US" dirty="0" smtClean="0"/>
+              <a:t>Choice of serial protocols</a:t>
+            </a:r>
+          </a:p>
+          <a:p>
+            <a:endParaRPr lang="en-US" dirty="0" smtClean="0"/>
           </a:p>
           <a:p>
             <a:endParaRPr lang="en-US" dirty="0"/>

</xml_diff>

<commit_message>
added rough estimate of time budget
</commit_message>
<xml_diff>
--- a/Design Review 1.pptx
+++ b/Design Review 1.pptx
@@ -4,6 +4,9 @@
   <p:sldMasterIdLst>
     <p:sldMasterId id="2147483648" r:id="rId1"/>
   </p:sldMasterIdLst>
+  <p:notesMasterIdLst>
+    <p:notesMasterId r:id="rId9"/>
+  </p:notesMasterIdLst>
   <p:sldIdLst>
     <p:sldId id="256" r:id="rId2"/>
     <p:sldId id="257" r:id="rId3"/>
@@ -116,6 +119,440 @@
     </p:ext>
   </p:extLst>
 </p:presentation>
+</file>
+
+<file path=ppt/notesMasters/notesMaster1.xml><?xml version="1.0" encoding="utf-8"?>
+<p:notesMaster xmlns:a="http://schemas.openxmlformats.org/drawingml/2006/main" xmlns:r="http://schemas.openxmlformats.org/officeDocument/2006/relationships" xmlns:p="http://schemas.openxmlformats.org/presentationml/2006/main">
+  <p:cSld>
+    <p:bg>
+      <p:bgRef idx="1001">
+        <a:schemeClr val="bg1"/>
+      </p:bgRef>
+    </p:bg>
+    <p:spTree>
+      <p:nvGrpSpPr>
+        <p:cNvPr id="1" name=""/>
+        <p:cNvGrpSpPr/>
+        <p:nvPr/>
+      </p:nvGrpSpPr>
+      <p:grpSpPr>
+        <a:xfrm>
+          <a:off x="0" y="0"/>
+          <a:ext cx="0" cy="0"/>
+          <a:chOff x="0" y="0"/>
+          <a:chExt cx="0" cy="0"/>
+        </a:xfrm>
+      </p:grpSpPr>
+      <p:sp>
+        <p:nvSpPr>
+          <p:cNvPr id="2" name="Header Placeholder 1"/>
+          <p:cNvSpPr>
+            <a:spLocks noGrp="1"/>
+          </p:cNvSpPr>
+          <p:nvPr>
+            <p:ph type="hdr" sz="quarter"/>
+          </p:nvPr>
+        </p:nvSpPr>
+        <p:spPr>
+          <a:xfrm>
+            <a:off x="0" y="0"/>
+            <a:ext cx="2971800" cy="458788"/>
+          </a:xfrm>
+          <a:prstGeom prst="rect">
+            <a:avLst/>
+          </a:prstGeom>
+        </p:spPr>
+        <p:txBody>
+          <a:bodyPr vert="horz" lIns="91440" tIns="45720" rIns="91440" bIns="45720" rtlCol="0"/>
+          <a:lstStyle>
+            <a:lvl1pPr algn="l">
+              <a:defRPr sz="1200"/>
+            </a:lvl1pPr>
+          </a:lstStyle>
+          <a:p>
+            <a:endParaRPr lang="en-US"/>
+          </a:p>
+        </p:txBody>
+      </p:sp>
+      <p:sp>
+        <p:nvSpPr>
+          <p:cNvPr id="3" name="Date Placeholder 2"/>
+          <p:cNvSpPr>
+            <a:spLocks noGrp="1"/>
+          </p:cNvSpPr>
+          <p:nvPr>
+            <p:ph type="dt" idx="1"/>
+          </p:nvPr>
+        </p:nvSpPr>
+        <p:spPr>
+          <a:xfrm>
+            <a:off x="3884613" y="0"/>
+            <a:ext cx="2971800" cy="458788"/>
+          </a:xfrm>
+          <a:prstGeom prst="rect">
+            <a:avLst/>
+          </a:prstGeom>
+        </p:spPr>
+        <p:txBody>
+          <a:bodyPr vert="horz" lIns="91440" tIns="45720" rIns="91440" bIns="45720" rtlCol="0"/>
+          <a:lstStyle>
+            <a:lvl1pPr algn="r">
+              <a:defRPr sz="1200"/>
+            </a:lvl1pPr>
+          </a:lstStyle>
+          <a:p>
+            <a:fld id="{63EC98D6-7B42-494C-8340-CE16CD190A86}" type="datetimeFigureOut">
+              <a:rPr lang="en-US" smtClean="0"/>
+              <a:t>9/11/2017</a:t>
+            </a:fld>
+            <a:endParaRPr lang="en-US"/>
+          </a:p>
+        </p:txBody>
+      </p:sp>
+      <p:sp>
+        <p:nvSpPr>
+          <p:cNvPr id="4" name="Slide Image Placeholder 3"/>
+          <p:cNvSpPr>
+            <a:spLocks noGrp="1" noRot="1" noChangeAspect="1"/>
+          </p:cNvSpPr>
+          <p:nvPr>
+            <p:ph type="sldImg" idx="2"/>
+          </p:nvPr>
+        </p:nvSpPr>
+        <p:spPr>
+          <a:xfrm>
+            <a:off x="685800" y="1143000"/>
+            <a:ext cx="5486400" cy="3086100"/>
+          </a:xfrm>
+          <a:prstGeom prst="rect">
+            <a:avLst/>
+          </a:prstGeom>
+          <a:noFill/>
+          <a:ln w="12700">
+            <a:solidFill>
+              <a:prstClr val="black"/>
+            </a:solidFill>
+          </a:ln>
+        </p:spPr>
+        <p:txBody>
+          <a:bodyPr vert="horz" lIns="91440" tIns="45720" rIns="91440" bIns="45720" rtlCol="0" anchor="ctr"/>
+          <a:lstStyle/>
+          <a:p>
+            <a:endParaRPr lang="en-US"/>
+          </a:p>
+        </p:txBody>
+      </p:sp>
+      <p:sp>
+        <p:nvSpPr>
+          <p:cNvPr id="5" name="Notes Placeholder 4"/>
+          <p:cNvSpPr>
+            <a:spLocks noGrp="1"/>
+          </p:cNvSpPr>
+          <p:nvPr>
+            <p:ph type="body" sz="quarter" idx="3"/>
+          </p:nvPr>
+        </p:nvSpPr>
+        <p:spPr>
+          <a:xfrm>
+            <a:off x="685800" y="4400550"/>
+            <a:ext cx="5486400" cy="3600450"/>
+          </a:xfrm>
+          <a:prstGeom prst="rect">
+            <a:avLst/>
+          </a:prstGeom>
+        </p:spPr>
+        <p:txBody>
+          <a:bodyPr vert="horz" lIns="91440" tIns="45720" rIns="91440" bIns="45720" rtlCol="0"/>
+          <a:lstStyle/>
+          <a:p>
+            <a:pPr lvl="0"/>
+            <a:r>
+              <a:rPr lang="en-US" smtClean="0"/>
+              <a:t>Click to edit Master text styles</a:t>
+            </a:r>
+          </a:p>
+          <a:p>
+            <a:pPr lvl="1"/>
+            <a:r>
+              <a:rPr lang="en-US" smtClean="0"/>
+              <a:t>Second level</a:t>
+            </a:r>
+          </a:p>
+          <a:p>
+            <a:pPr lvl="2"/>
+            <a:r>
+              <a:rPr lang="en-US" smtClean="0"/>
+              <a:t>Third level</a:t>
+            </a:r>
+          </a:p>
+          <a:p>
+            <a:pPr lvl="3"/>
+            <a:r>
+              <a:rPr lang="en-US" smtClean="0"/>
+              <a:t>Fourth level</a:t>
+            </a:r>
+          </a:p>
+          <a:p>
+            <a:pPr lvl="4"/>
+            <a:r>
+              <a:rPr lang="en-US" smtClean="0"/>
+              <a:t>Fifth level</a:t>
+            </a:r>
+            <a:endParaRPr lang="en-US"/>
+          </a:p>
+        </p:txBody>
+      </p:sp>
+      <p:sp>
+        <p:nvSpPr>
+          <p:cNvPr id="6" name="Footer Placeholder 5"/>
+          <p:cNvSpPr>
+            <a:spLocks noGrp="1"/>
+          </p:cNvSpPr>
+          <p:nvPr>
+            <p:ph type="ftr" sz="quarter" idx="4"/>
+          </p:nvPr>
+        </p:nvSpPr>
+        <p:spPr>
+          <a:xfrm>
+            <a:off x="0" y="8685213"/>
+            <a:ext cx="2971800" cy="458787"/>
+          </a:xfrm>
+          <a:prstGeom prst="rect">
+            <a:avLst/>
+          </a:prstGeom>
+        </p:spPr>
+        <p:txBody>
+          <a:bodyPr vert="horz" lIns="91440" tIns="45720" rIns="91440" bIns="45720" rtlCol="0" anchor="b"/>
+          <a:lstStyle>
+            <a:lvl1pPr algn="l">
+              <a:defRPr sz="1200"/>
+            </a:lvl1pPr>
+          </a:lstStyle>
+          <a:p>
+            <a:endParaRPr lang="en-US"/>
+          </a:p>
+        </p:txBody>
+      </p:sp>
+      <p:sp>
+        <p:nvSpPr>
+          <p:cNvPr id="7" name="Slide Number Placeholder 6"/>
+          <p:cNvSpPr>
+            <a:spLocks noGrp="1"/>
+          </p:cNvSpPr>
+          <p:nvPr>
+            <p:ph type="sldNum" sz="quarter" idx="5"/>
+          </p:nvPr>
+        </p:nvSpPr>
+        <p:spPr>
+          <a:xfrm>
+            <a:off x="3884613" y="8685213"/>
+            <a:ext cx="2971800" cy="458787"/>
+          </a:xfrm>
+          <a:prstGeom prst="rect">
+            <a:avLst/>
+          </a:prstGeom>
+        </p:spPr>
+        <p:txBody>
+          <a:bodyPr vert="horz" lIns="91440" tIns="45720" rIns="91440" bIns="45720" rtlCol="0" anchor="b"/>
+          <a:lstStyle>
+            <a:lvl1pPr algn="r">
+              <a:defRPr sz="1200"/>
+            </a:lvl1pPr>
+          </a:lstStyle>
+          <a:p>
+            <a:fld id="{26287725-299B-4535-BBA8-D41298155406}" type="slidenum">
+              <a:rPr lang="en-US" smtClean="0"/>
+              <a:t>‹#›</a:t>
+            </a:fld>
+            <a:endParaRPr lang="en-US"/>
+          </a:p>
+        </p:txBody>
+      </p:sp>
+    </p:spTree>
+    <p:extLst>
+      <p:ext uri="{BB962C8B-B14F-4D97-AF65-F5344CB8AC3E}">
+        <p14:creationId xmlns:p14="http://schemas.microsoft.com/office/powerpoint/2010/main" val="2098732711"/>
+      </p:ext>
+    </p:extLst>
+  </p:cSld>
+  <p:clrMap bg1="lt1" tx1="dk1" bg2="lt2" tx2="dk2" accent1="accent1" accent2="accent2" accent3="accent3" accent4="accent4" accent5="accent5" accent6="accent6" hlink="hlink" folHlink="folHlink"/>
+  <p:notesStyle>
+    <a:lvl1pPr marL="0" algn="l" defTabSz="914400" rtl="0" eaLnBrk="1" latinLnBrk="0" hangingPunct="1">
+      <a:defRPr sz="1200" kern="1200">
+        <a:solidFill>
+          <a:schemeClr val="tx1"/>
+        </a:solidFill>
+        <a:latin typeface="+mn-lt"/>
+        <a:ea typeface="+mn-ea"/>
+        <a:cs typeface="+mn-cs"/>
+      </a:defRPr>
+    </a:lvl1pPr>
+    <a:lvl2pPr marL="457200" algn="l" defTabSz="914400" rtl="0" eaLnBrk="1" latinLnBrk="0" hangingPunct="1">
+      <a:defRPr sz="1200" kern="1200">
+        <a:solidFill>
+          <a:schemeClr val="tx1"/>
+        </a:solidFill>
+        <a:latin typeface="+mn-lt"/>
+        <a:ea typeface="+mn-ea"/>
+        <a:cs typeface="+mn-cs"/>
+      </a:defRPr>
+    </a:lvl2pPr>
+    <a:lvl3pPr marL="914400" algn="l" defTabSz="914400" rtl="0" eaLnBrk="1" latinLnBrk="0" hangingPunct="1">
+      <a:defRPr sz="1200" kern="1200">
+        <a:solidFill>
+          <a:schemeClr val="tx1"/>
+        </a:solidFill>
+        <a:latin typeface="+mn-lt"/>
+        <a:ea typeface="+mn-ea"/>
+        <a:cs typeface="+mn-cs"/>
+      </a:defRPr>
+    </a:lvl3pPr>
+    <a:lvl4pPr marL="1371600" algn="l" defTabSz="914400" rtl="0" eaLnBrk="1" latinLnBrk="0" hangingPunct="1">
+      <a:defRPr sz="1200" kern="1200">
+        <a:solidFill>
+          <a:schemeClr val="tx1"/>
+        </a:solidFill>
+        <a:latin typeface="+mn-lt"/>
+        <a:ea typeface="+mn-ea"/>
+        <a:cs typeface="+mn-cs"/>
+      </a:defRPr>
+    </a:lvl4pPr>
+    <a:lvl5pPr marL="1828800" algn="l" defTabSz="914400" rtl="0" eaLnBrk="1" latinLnBrk="0" hangingPunct="1">
+      <a:defRPr sz="1200" kern="1200">
+        <a:solidFill>
+          <a:schemeClr val="tx1"/>
+        </a:solidFill>
+        <a:latin typeface="+mn-lt"/>
+        <a:ea typeface="+mn-ea"/>
+        <a:cs typeface="+mn-cs"/>
+      </a:defRPr>
+    </a:lvl5pPr>
+    <a:lvl6pPr marL="2286000" algn="l" defTabSz="914400" rtl="0" eaLnBrk="1" latinLnBrk="0" hangingPunct="1">
+      <a:defRPr sz="1200" kern="1200">
+        <a:solidFill>
+          <a:schemeClr val="tx1"/>
+        </a:solidFill>
+        <a:latin typeface="+mn-lt"/>
+        <a:ea typeface="+mn-ea"/>
+        <a:cs typeface="+mn-cs"/>
+      </a:defRPr>
+    </a:lvl6pPr>
+    <a:lvl7pPr marL="2743200" algn="l" defTabSz="914400" rtl="0" eaLnBrk="1" latinLnBrk="0" hangingPunct="1">
+      <a:defRPr sz="1200" kern="1200">
+        <a:solidFill>
+          <a:schemeClr val="tx1"/>
+        </a:solidFill>
+        <a:latin typeface="+mn-lt"/>
+        <a:ea typeface="+mn-ea"/>
+        <a:cs typeface="+mn-cs"/>
+      </a:defRPr>
+    </a:lvl7pPr>
+    <a:lvl8pPr marL="3200400" algn="l" defTabSz="914400" rtl="0" eaLnBrk="1" latinLnBrk="0" hangingPunct="1">
+      <a:defRPr sz="1200" kern="1200">
+        <a:solidFill>
+          <a:schemeClr val="tx1"/>
+        </a:solidFill>
+        <a:latin typeface="+mn-lt"/>
+        <a:ea typeface="+mn-ea"/>
+        <a:cs typeface="+mn-cs"/>
+      </a:defRPr>
+    </a:lvl8pPr>
+    <a:lvl9pPr marL="3657600" algn="l" defTabSz="914400" rtl="0" eaLnBrk="1" latinLnBrk="0" hangingPunct="1">
+      <a:defRPr sz="1200" kern="1200">
+        <a:solidFill>
+          <a:schemeClr val="tx1"/>
+        </a:solidFill>
+        <a:latin typeface="+mn-lt"/>
+        <a:ea typeface="+mn-ea"/>
+        <a:cs typeface="+mn-cs"/>
+      </a:defRPr>
+    </a:lvl9pPr>
+  </p:notesStyle>
+</p:notesMaster>
+</file>
+
+<file path=ppt/notesSlides/notesSlide1.xml><?xml version="1.0" encoding="utf-8"?>
+<p:notes xmlns:a="http://schemas.openxmlformats.org/drawingml/2006/main" xmlns:r="http://schemas.openxmlformats.org/officeDocument/2006/relationships" xmlns:p="http://schemas.openxmlformats.org/presentationml/2006/main">
+  <p:cSld>
+    <p:spTree>
+      <p:nvGrpSpPr>
+        <p:cNvPr id="1" name=""/>
+        <p:cNvGrpSpPr/>
+        <p:nvPr/>
+      </p:nvGrpSpPr>
+      <p:grpSpPr>
+        <a:xfrm>
+          <a:off x="0" y="0"/>
+          <a:ext cx="0" cy="0"/>
+          <a:chOff x="0" y="0"/>
+          <a:chExt cx="0" cy="0"/>
+        </a:xfrm>
+      </p:grpSpPr>
+      <p:sp>
+        <p:nvSpPr>
+          <p:cNvPr id="2" name="Slide Image Placeholder 1"/>
+          <p:cNvSpPr>
+            <a:spLocks noGrp="1" noRot="1" noChangeAspect="1"/>
+          </p:cNvSpPr>
+          <p:nvPr>
+            <p:ph type="sldImg"/>
+          </p:nvPr>
+        </p:nvSpPr>
+        <p:spPr/>
+      </p:sp>
+      <p:sp>
+        <p:nvSpPr>
+          <p:cNvPr id="3" name="Notes Placeholder 2"/>
+          <p:cNvSpPr>
+            <a:spLocks noGrp="1"/>
+          </p:cNvSpPr>
+          <p:nvPr>
+            <p:ph type="body" idx="1"/>
+          </p:nvPr>
+        </p:nvSpPr>
+        <p:spPr/>
+        <p:txBody>
+          <a:bodyPr/>
+          <a:lstStyle/>
+          <a:p>
+            <a:endParaRPr lang="en-US" dirty="0"/>
+          </a:p>
+        </p:txBody>
+      </p:sp>
+      <p:sp>
+        <p:nvSpPr>
+          <p:cNvPr id="4" name="Slide Number Placeholder 3"/>
+          <p:cNvSpPr>
+            <a:spLocks noGrp="1"/>
+          </p:cNvSpPr>
+          <p:nvPr>
+            <p:ph type="sldNum" sz="quarter" idx="10"/>
+          </p:nvPr>
+        </p:nvSpPr>
+        <p:spPr/>
+        <p:txBody>
+          <a:bodyPr/>
+          <a:lstStyle/>
+          <a:p>
+            <a:fld id="{26287725-299B-4535-BBA8-D41298155406}" type="slidenum">
+              <a:rPr lang="en-US" smtClean="0"/>
+              <a:t>5</a:t>
+            </a:fld>
+            <a:endParaRPr lang="en-US"/>
+          </a:p>
+        </p:txBody>
+      </p:sp>
+    </p:spTree>
+    <p:extLst>
+      <p:ext uri="{BB962C8B-B14F-4D97-AF65-F5344CB8AC3E}">
+        <p14:creationId xmlns:p14="http://schemas.microsoft.com/office/powerpoint/2010/main" val="652375468"/>
+      </p:ext>
+    </p:extLst>
+  </p:cSld>
+  <p:clrMapOvr>
+    <a:masterClrMapping/>
+  </p:clrMapOvr>
+</p:notes>
 </file>
 
 <file path=ppt/slideLayouts/slideLayout1.xml><?xml version="1.0" encoding="utf-8"?>
@@ -3794,7 +4231,7 @@
           </p:nvPr>
         </p:nvPicPr>
         <p:blipFill>
-          <a:blip r:embed="rId2">
+          <a:blip r:embed="rId3">
             <a:extLst>
               <a:ext uri="{28A0092B-C50C-407E-A947-70E740481C1C}">
                 <a14:useLocalDpi xmlns:a14="http://schemas.microsoft.com/office/drawing/2010/main" val="0"/>
@@ -3882,14 +4319,151 @@
             <p:ph idx="1"/>
           </p:nvPr>
         </p:nvSpPr>
-        <p:spPr/>
-        <p:txBody>
-          <a:bodyPr/>
+        <p:spPr>
+          <a:xfrm>
+            <a:off x="838200" y="1490472"/>
+            <a:ext cx="10515600" cy="4686491"/>
+          </a:xfrm>
+        </p:spPr>
+        <p:txBody>
+          <a:bodyPr>
+            <a:normAutofit fontScale="92500" lnSpcReduction="20000"/>
+          </a:bodyPr>
           <a:lstStyle/>
           <a:p>
             <a:r>
               <a:rPr lang="en-US" dirty="0" smtClean="0"/>
-              <a:t>Two UDOO Quads: 2*$135 = $270</a:t>
+              <a:t>Time</a:t>
+            </a:r>
+          </a:p>
+          <a:p>
+            <a:pPr lvl="1"/>
+            <a:r>
+              <a:rPr lang="en-US" dirty="0" smtClean="0"/>
+              <a:t>Predicted 60% in PM or ~216 </a:t>
+            </a:r>
+            <a:r>
+              <a:rPr lang="en-US" dirty="0" err="1" smtClean="0"/>
+              <a:t>hrs</a:t>
+            </a:r>
+            <a:endParaRPr lang="en-US" dirty="0" smtClean="0"/>
+          </a:p>
+          <a:p>
+            <a:pPr marL="914400" lvl="2" indent="0">
+              <a:buNone/>
+            </a:pPr>
+            <a:r>
+              <a:rPr lang="en-US" dirty="0" smtClean="0"/>
+              <a:t>~60 </a:t>
+            </a:r>
+            <a:r>
+              <a:rPr lang="en-US" dirty="0" err="1" smtClean="0"/>
+              <a:t>hrs</a:t>
+            </a:r>
+            <a:r>
+              <a:rPr lang="en-US" dirty="0" smtClean="0"/>
+              <a:t> in Control of Scope/Cost/Time</a:t>
+            </a:r>
+          </a:p>
+          <a:p>
+            <a:pPr marL="914400" lvl="2" indent="0">
+              <a:buNone/>
+            </a:pPr>
+            <a:r>
+              <a:rPr lang="en-US" dirty="0" smtClean="0"/>
+              <a:t>~35 </a:t>
+            </a:r>
+            <a:r>
+              <a:rPr lang="en-US" dirty="0" err="1"/>
+              <a:t>hrs</a:t>
+            </a:r>
+            <a:r>
+              <a:rPr lang="en-US" dirty="0"/>
+              <a:t> in Preparing Reports</a:t>
+            </a:r>
+          </a:p>
+          <a:p>
+            <a:pPr marL="914400" lvl="2" indent="0">
+              <a:buNone/>
+            </a:pPr>
+            <a:r>
+              <a:rPr lang="en-US" dirty="0" smtClean="0"/>
+              <a:t>~26 </a:t>
+            </a:r>
+            <a:r>
+              <a:rPr lang="en-US" dirty="0" err="1" smtClean="0"/>
+              <a:t>hrs</a:t>
+            </a:r>
+            <a:r>
+              <a:rPr lang="en-US" dirty="0" smtClean="0"/>
+              <a:t> in Task Allocations</a:t>
+            </a:r>
+          </a:p>
+          <a:p>
+            <a:pPr marL="914400" lvl="2" indent="0">
+              <a:buNone/>
+            </a:pPr>
+            <a:r>
+              <a:rPr lang="en-US" dirty="0" smtClean="0"/>
+              <a:t>~45 </a:t>
+            </a:r>
+            <a:r>
+              <a:rPr lang="en-US" dirty="0" err="1" smtClean="0"/>
+              <a:t>hrs</a:t>
+            </a:r>
+            <a:r>
+              <a:rPr lang="en-US" dirty="0" smtClean="0"/>
+              <a:t> in Coordination of Project</a:t>
+            </a:r>
+          </a:p>
+          <a:p>
+            <a:pPr marL="914400" lvl="2" indent="0">
+              <a:buNone/>
+            </a:pPr>
+            <a:r>
+              <a:rPr lang="en-US" dirty="0" smtClean="0"/>
+              <a:t>~50 </a:t>
+            </a:r>
+            <a:r>
+              <a:rPr lang="en-US" dirty="0" err="1" smtClean="0"/>
+              <a:t>hrs</a:t>
+            </a:r>
+            <a:r>
+              <a:rPr lang="en-US" dirty="0" smtClean="0"/>
+              <a:t> in Research</a:t>
+            </a:r>
+          </a:p>
+          <a:p>
+            <a:pPr lvl="1"/>
+            <a:r>
+              <a:rPr lang="en-US" dirty="0" smtClean="0"/>
+              <a:t>360 hours in project</a:t>
+            </a:r>
+            <a:endParaRPr lang="en-US" dirty="0" smtClean="0"/>
+          </a:p>
+          <a:p>
+            <a:pPr lvl="2"/>
+            <a:r>
+              <a:rPr lang="en-US" dirty="0" smtClean="0"/>
+              <a:t>Predicting 4 hours per person per week</a:t>
+            </a:r>
+          </a:p>
+          <a:p>
+            <a:pPr lvl="2"/>
+            <a:r>
+              <a:rPr lang="en-US" dirty="0" smtClean="0"/>
+              <a:t>14 Weeks in first Semester, 12 in Second before April, 4 weeks left for final testing</a:t>
+            </a:r>
+            <a:endParaRPr lang="en-US" dirty="0" smtClean="0"/>
+          </a:p>
+          <a:p>
+            <a:r>
+              <a:rPr lang="en-US" dirty="0" smtClean="0"/>
+              <a:t>Two </a:t>
+            </a:r>
+            <a:r>
+              <a:rPr lang="en-US" dirty="0" smtClean="0"/>
+              <a:t>UDOO Quads: 2*$135 = $270</a:t>
             </a:r>
           </a:p>
           <a:p>
@@ -3908,7 +4482,11 @@
             <a:pPr lvl="1"/>
             <a:r>
               <a:rPr lang="en-US" dirty="0" smtClean="0"/>
-              <a:t>Depending on what ORU already has</a:t>
+              <a:t>Depending on what ORU already </a:t>
+            </a:r>
+            <a:r>
+              <a:rPr lang="en-US" dirty="0" smtClean="0"/>
+              <a:t>has</a:t>
             </a:r>
             <a:endParaRPr lang="en-US" dirty="0"/>
           </a:p>
@@ -4279,4 +4857,265 @@
     </a:ext>
   </a:extLst>
 </a:theme>
+</file>
+
+<file path=ppt/theme/theme2.xml><?xml version="1.0" encoding="utf-8"?>
+<a:theme xmlns:a="http://schemas.openxmlformats.org/drawingml/2006/main" name="Office Theme">
+  <a:themeElements>
+    <a:clrScheme name="Office">
+      <a:dk1>
+        <a:sysClr val="windowText" lastClr="000000"/>
+      </a:dk1>
+      <a:lt1>
+        <a:sysClr val="window" lastClr="FFFFFF"/>
+      </a:lt1>
+      <a:dk2>
+        <a:srgbClr val="44546A"/>
+      </a:dk2>
+      <a:lt2>
+        <a:srgbClr val="E7E6E6"/>
+      </a:lt2>
+      <a:accent1>
+        <a:srgbClr val="5B9BD5"/>
+      </a:accent1>
+      <a:accent2>
+        <a:srgbClr val="ED7D31"/>
+      </a:accent2>
+      <a:accent3>
+        <a:srgbClr val="A5A5A5"/>
+      </a:accent3>
+      <a:accent4>
+        <a:srgbClr val="FFC000"/>
+      </a:accent4>
+      <a:accent5>
+        <a:srgbClr val="4472C4"/>
+      </a:accent5>
+      <a:accent6>
+        <a:srgbClr val="70AD47"/>
+      </a:accent6>
+      <a:hlink>
+        <a:srgbClr val="0563C1"/>
+      </a:hlink>
+      <a:folHlink>
+        <a:srgbClr val="954F72"/>
+      </a:folHlink>
+    </a:clrScheme>
+    <a:fontScheme name="Office">
+      <a:majorFont>
+        <a:latin typeface="Calibri Light" panose="020F0302020204030204"/>
+        <a:ea typeface=""/>
+        <a:cs typeface=""/>
+        <a:font script="Jpan" typeface="ＭＳ Ｐゴシック"/>
+        <a:font script="Hang" typeface="맑은 고딕"/>
+        <a:font script="Hans" typeface="宋体"/>
+        <a:font script="Hant" typeface="新細明體"/>
+        <a:font script="Arab" typeface="Times New Roman"/>
+        <a:font script="Hebr" typeface="Times New Roman"/>
+        <a:font script="Thai" typeface="Angsana New"/>
+        <a:font script="Ethi" typeface="Nyala"/>
+        <a:font script="Beng" typeface="Vrinda"/>
+        <a:font script="Gujr" typeface="Shruti"/>
+        <a:font script="Khmr" typeface="MoolBoran"/>
+        <a:font script="Knda" typeface="Tunga"/>
+        <a:font script="Guru" typeface="Raavi"/>
+        <a:font script="Cans" typeface="Euphemia"/>
+        <a:font script="Cher" typeface="Plantagenet Cherokee"/>
+        <a:font script="Yiii" typeface="Microsoft Yi Baiti"/>
+        <a:font script="Tibt" typeface="Microsoft Himalaya"/>
+        <a:font script="Thaa" typeface="MV Boli"/>
+        <a:font script="Deva" typeface="Mangal"/>
+        <a:font script="Telu" typeface="Gautami"/>
+        <a:font script="Taml" typeface="Latha"/>
+        <a:font script="Syrc" typeface="Estrangelo Edessa"/>
+        <a:font script="Orya" typeface="Kalinga"/>
+        <a:font script="Mlym" typeface="Kartika"/>
+        <a:font script="Laoo" typeface="DokChampa"/>
+        <a:font script="Sinh" typeface="Iskoola Pota"/>
+        <a:font script="Mong" typeface="Mongolian Baiti"/>
+        <a:font script="Viet" typeface="Times New Roman"/>
+        <a:font script="Uigh" typeface="Microsoft Uighur"/>
+        <a:font script="Geor" typeface="Sylfaen"/>
+      </a:majorFont>
+      <a:minorFont>
+        <a:latin typeface="Calibri" panose="020F0502020204030204"/>
+        <a:ea typeface=""/>
+        <a:cs typeface=""/>
+        <a:font script="Jpan" typeface="ＭＳ Ｐゴシック"/>
+        <a:font script="Hang" typeface="맑은 고딕"/>
+        <a:font script="Hans" typeface="宋体"/>
+        <a:font script="Hant" typeface="新細明體"/>
+        <a:font script="Arab" typeface="Arial"/>
+        <a:font script="Hebr" typeface="Arial"/>
+        <a:font script="Thai" typeface="Cordia New"/>
+        <a:font script="Ethi" typeface="Nyala"/>
+        <a:font script="Beng" typeface="Vrinda"/>
+        <a:font script="Gujr" typeface="Shruti"/>
+        <a:font script="Khmr" typeface="DaunPenh"/>
+        <a:font script="Knda" typeface="Tunga"/>
+        <a:font script="Guru" typeface="Raavi"/>
+        <a:font script="Cans" typeface="Euphemia"/>
+        <a:font script="Cher" typeface="Plantagenet Cherokee"/>
+        <a:font script="Yiii" typeface="Microsoft Yi Baiti"/>
+        <a:font script="Tibt" typeface="Microsoft Himalaya"/>
+        <a:font script="Thaa" typeface="MV Boli"/>
+        <a:font script="Deva" typeface="Mangal"/>
+        <a:font script="Telu" typeface="Gautami"/>
+        <a:font script="Taml" typeface="Latha"/>
+        <a:font script="Syrc" typeface="Estrangelo Edessa"/>
+        <a:font script="Orya" typeface="Kalinga"/>
+        <a:font script="Mlym" typeface="Kartika"/>
+        <a:font script="Laoo" typeface="DokChampa"/>
+        <a:font script="Sinh" typeface="Iskoola Pota"/>
+        <a:font script="Mong" typeface="Mongolian Baiti"/>
+        <a:font script="Viet" typeface="Arial"/>
+        <a:font script="Uigh" typeface="Microsoft Uighur"/>
+        <a:font script="Geor" typeface="Sylfaen"/>
+      </a:minorFont>
+    </a:fontScheme>
+    <a:fmtScheme name="Office">
+      <a:fillStyleLst>
+        <a:solidFill>
+          <a:schemeClr val="phClr"/>
+        </a:solidFill>
+        <a:gradFill rotWithShape="1">
+          <a:gsLst>
+            <a:gs pos="0">
+              <a:schemeClr val="phClr">
+                <a:lumMod val="110000"/>
+                <a:satMod val="105000"/>
+                <a:tint val="67000"/>
+              </a:schemeClr>
+            </a:gs>
+            <a:gs pos="50000">
+              <a:schemeClr val="phClr">
+                <a:lumMod val="105000"/>
+                <a:satMod val="103000"/>
+                <a:tint val="73000"/>
+              </a:schemeClr>
+            </a:gs>
+            <a:gs pos="100000">
+              <a:schemeClr val="phClr">
+                <a:lumMod val="105000"/>
+                <a:satMod val="109000"/>
+                <a:tint val="81000"/>
+              </a:schemeClr>
+            </a:gs>
+          </a:gsLst>
+          <a:lin ang="5400000" scaled="0"/>
+        </a:gradFill>
+        <a:gradFill rotWithShape="1">
+          <a:gsLst>
+            <a:gs pos="0">
+              <a:schemeClr val="phClr">
+                <a:satMod val="103000"/>
+                <a:lumMod val="102000"/>
+                <a:tint val="94000"/>
+              </a:schemeClr>
+            </a:gs>
+            <a:gs pos="50000">
+              <a:schemeClr val="phClr">
+                <a:satMod val="110000"/>
+                <a:lumMod val="100000"/>
+                <a:shade val="100000"/>
+              </a:schemeClr>
+            </a:gs>
+            <a:gs pos="100000">
+              <a:schemeClr val="phClr">
+                <a:lumMod val="99000"/>
+                <a:satMod val="120000"/>
+                <a:shade val="78000"/>
+              </a:schemeClr>
+            </a:gs>
+          </a:gsLst>
+          <a:lin ang="5400000" scaled="0"/>
+        </a:gradFill>
+      </a:fillStyleLst>
+      <a:lnStyleLst>
+        <a:ln w="6350" cap="flat" cmpd="sng" algn="ctr">
+          <a:solidFill>
+            <a:schemeClr val="phClr"/>
+          </a:solidFill>
+          <a:prstDash val="solid"/>
+          <a:miter lim="800000"/>
+        </a:ln>
+        <a:ln w="12700" cap="flat" cmpd="sng" algn="ctr">
+          <a:solidFill>
+            <a:schemeClr val="phClr"/>
+          </a:solidFill>
+          <a:prstDash val="solid"/>
+          <a:miter lim="800000"/>
+        </a:ln>
+        <a:ln w="19050" cap="flat" cmpd="sng" algn="ctr">
+          <a:solidFill>
+            <a:schemeClr val="phClr"/>
+          </a:solidFill>
+          <a:prstDash val="solid"/>
+          <a:miter lim="800000"/>
+        </a:ln>
+      </a:lnStyleLst>
+      <a:effectStyleLst>
+        <a:effectStyle>
+          <a:effectLst/>
+        </a:effectStyle>
+        <a:effectStyle>
+          <a:effectLst/>
+        </a:effectStyle>
+        <a:effectStyle>
+          <a:effectLst>
+            <a:outerShdw blurRad="57150" dist="19050" dir="5400000" algn="ctr" rotWithShape="0">
+              <a:srgbClr val="000000">
+                <a:alpha val="63000"/>
+              </a:srgbClr>
+            </a:outerShdw>
+          </a:effectLst>
+        </a:effectStyle>
+      </a:effectStyleLst>
+      <a:bgFillStyleLst>
+        <a:solidFill>
+          <a:schemeClr val="phClr"/>
+        </a:solidFill>
+        <a:solidFill>
+          <a:schemeClr val="phClr">
+            <a:tint val="95000"/>
+            <a:satMod val="170000"/>
+          </a:schemeClr>
+        </a:solidFill>
+        <a:gradFill rotWithShape="1">
+          <a:gsLst>
+            <a:gs pos="0">
+              <a:schemeClr val="phClr">
+                <a:tint val="93000"/>
+                <a:satMod val="150000"/>
+                <a:shade val="98000"/>
+                <a:lumMod val="102000"/>
+              </a:schemeClr>
+            </a:gs>
+            <a:gs pos="50000">
+              <a:schemeClr val="phClr">
+                <a:tint val="98000"/>
+                <a:satMod val="130000"/>
+                <a:shade val="90000"/>
+                <a:lumMod val="103000"/>
+              </a:schemeClr>
+            </a:gs>
+            <a:gs pos="100000">
+              <a:schemeClr val="phClr">
+                <a:shade val="63000"/>
+                <a:satMod val="120000"/>
+              </a:schemeClr>
+            </a:gs>
+          </a:gsLst>
+          <a:lin ang="5400000" scaled="0"/>
+        </a:gradFill>
+      </a:bgFillStyleLst>
+    </a:fmtScheme>
+  </a:themeElements>
+  <a:objectDefaults/>
+  <a:extraClrSchemeLst/>
+  <a:extLst>
+    <a:ext uri="{05A4C25C-085E-4340-85A3-A5531E510DB2}">
+      <thm15:themeFamily xmlns:thm15="http://schemas.microsoft.com/office/thememl/2012/main" name="Office Theme" id="{62F939B6-93AF-4DB8-9C6B-D6C7DFDC589F}" vid="{4A3C46E8-61CC-4603-A589-7422A47A8E4A}"/>
+    </a:ext>
+  </a:extLst>
+</a:theme>
 </file>
</xml_diff>